<commit_message>
Auto stash before rebase of "origin/develop"
</commit_message>
<xml_diff>
--- a/sys-doc/Präsentation.pptx
+++ b/sys-doc/Präsentation.pptx
@@ -8115,14 +8115,10 @@
           <a:lstStyle/>
           <a:p>
             <a:r>
-              <a:rPr lang="de-DE" dirty="0">
-                <a:solidFill>
-                  <a:schemeClr val="bg1"/>
-                </a:solidFill>
-                <a:latin typeface="Meta Pro" panose="02000503040000020004" pitchFamily="2" charset="0"/>
-              </a:rPr>
-              <a:t>Datum</a:t>
-            </a:r>
+              <a:rPr lang="de-DE" dirty="0"/>
+              <a:t>04.07.2022</a:t>
+            </a:r>
+            <a:endParaRPr lang="en-GB" dirty="0"/>
           </a:p>
         </p:txBody>
       </p:sp>
@@ -8534,11 +8530,10 @@
           <a:lstStyle/>
           <a:p>
             <a:r>
-              <a:rPr lang="de-DE" dirty="0">
-                <a:latin typeface="Meta Pro" panose="02000503040000020004" pitchFamily="2" charset="0"/>
-              </a:rPr>
-              <a:t>Datum</a:t>
-            </a:r>
+              <a:rPr lang="de-DE" dirty="0"/>
+              <a:t>04.07.2022</a:t>
+            </a:r>
+            <a:endParaRPr lang="en-GB" dirty="0"/>
           </a:p>
         </p:txBody>
       </p:sp>
@@ -8715,7 +8710,7 @@
           <a:lstStyle/>
           <a:p>
             <a:r>
-              <a:rPr lang="de-DE"/>
+              <a:rPr lang="de-DE" dirty="0"/>
               <a:t>04.07.2022</a:t>
             </a:r>
             <a:endParaRPr lang="en-GB" dirty="0"/>
@@ -8877,7 +8872,7 @@
         </p:spPr>
         <p:txBody>
           <a:bodyPr wrap="none" anchor="ctr">
-            <a:normAutofit/>
+            <a:noAutofit/>
           </a:bodyPr>
           <a:lstStyle/>
           <a:p>
@@ -8890,7 +8885,7 @@
               </a:spcAft>
             </a:pPr>
             <a:fld id="{58B5944C-422B-400C-ACEC-079F06A0E4F8}" type="slidenum">
-              <a:rPr lang="de-DE" sz="500" smtClean="0"/>
+              <a:rPr lang="de-DE" smtClean="0"/>
               <a:pPr>
                 <a:lnSpc>
                   <a:spcPct val="90000"/>
@@ -8901,7 +8896,7 @@
               </a:pPr>
               <a:t>3</a:t>
             </a:fld>
-            <a:endParaRPr lang="de-DE" sz="500"/>
+            <a:endParaRPr lang="de-DE" dirty="0"/>
           </a:p>
         </p:txBody>
       </p:sp>
@@ -8969,22 +8964,15 @@
         </p:spPr>
         <p:txBody>
           <a:bodyPr wrap="none" anchor="ctr">
-            <a:normAutofit/>
+            <a:noAutofit/>
           </a:bodyPr>
           <a:lstStyle/>
           <a:p>
-            <a:pPr>
-              <a:lnSpc>
-                <a:spcPct val="90000"/>
-              </a:lnSpc>
-              <a:spcAft>
-                <a:spcPts val="600"/>
-              </a:spcAft>
-            </a:pPr>
-            <a:r>
-              <a:rPr lang="de-DE" sz="500"/>
-              <a:t>Datum</a:t>
-            </a:r>
+            <a:r>
+              <a:rPr lang="de-DE" dirty="0"/>
+              <a:t>04.07.2022</a:t>
+            </a:r>
+            <a:endParaRPr lang="en-GB" dirty="0"/>
           </a:p>
         </p:txBody>
       </p:sp>
@@ -9579,7 +9567,7 @@
         </p:spPr>
         <p:txBody>
           <a:bodyPr wrap="none" anchor="ctr">
-            <a:normAutofit/>
+            <a:noAutofit/>
           </a:bodyPr>
           <a:lstStyle/>
           <a:p>
@@ -9592,7 +9580,7 @@
               </a:spcAft>
             </a:pPr>
             <a:fld id="{58B5944C-422B-400C-ACEC-079F06A0E4F8}" type="slidenum">
-              <a:rPr lang="de-DE" sz="500" smtClean="0"/>
+              <a:rPr lang="de-DE" smtClean="0"/>
               <a:pPr>
                 <a:lnSpc>
                   <a:spcPct val="90000"/>
@@ -9603,7 +9591,7 @@
               </a:pPr>
               <a:t>6</a:t>
             </a:fld>
-            <a:endParaRPr lang="de-DE" sz="500"/>
+            <a:endParaRPr lang="de-DE" dirty="0"/>
           </a:p>
         </p:txBody>
       </p:sp>
@@ -9671,7 +9659,7 @@
         </p:spPr>
         <p:txBody>
           <a:bodyPr wrap="none" anchor="ctr">
-            <a:normAutofit/>
+            <a:noAutofit/>
           </a:bodyPr>
           <a:lstStyle/>
           <a:p>
@@ -9684,10 +9672,10 @@
               </a:spcAft>
             </a:pPr>
             <a:r>
-              <a:rPr lang="de-DE" sz="500"/>
+              <a:rPr lang="de-DE" dirty="0"/>
               <a:t>04.07.2022</a:t>
             </a:r>
-            <a:endParaRPr lang="en-GB" sz="500"/>
+            <a:endParaRPr lang="en-GB" dirty="0"/>
           </a:p>
         </p:txBody>
       </p:sp>
@@ -9944,56 +9932,6 @@
       </p:grpSpPr>
       <p:sp>
         <p:nvSpPr>
-          <p:cNvPr id="2" name="Inhaltsplatzhalter 1">
-            <a:extLst>
-              <a:ext uri="{FF2B5EF4-FFF2-40B4-BE49-F238E27FC236}">
-                <a16:creationId xmlns:a16="http://schemas.microsoft.com/office/drawing/2014/main" id="{184AAB47-F3B2-F517-5273-9204B09D96B2}"/>
-              </a:ext>
-            </a:extLst>
-          </p:cNvPr>
-          <p:cNvSpPr>
-            <a:spLocks noGrp="1"/>
-          </p:cNvSpPr>
-          <p:nvPr>
-            <p:ph idx="1"/>
-          </p:nvPr>
-        </p:nvSpPr>
-        <p:spPr/>
-        <p:txBody>
-          <a:bodyPr/>
-          <a:lstStyle/>
-          <a:p>
-            <a:endParaRPr lang="de-DE"/>
-          </a:p>
-        </p:txBody>
-      </p:sp>
-      <p:sp>
-        <p:nvSpPr>
-          <p:cNvPr id="3" name="Inhaltsplatzhalter 2">
-            <a:extLst>
-              <a:ext uri="{FF2B5EF4-FFF2-40B4-BE49-F238E27FC236}">
-                <a16:creationId xmlns:a16="http://schemas.microsoft.com/office/drawing/2014/main" id="{08160BA4-F705-3E68-4657-008B952AEE18}"/>
-              </a:ext>
-            </a:extLst>
-          </p:cNvPr>
-          <p:cNvSpPr>
-            <a:spLocks noGrp="1"/>
-          </p:cNvSpPr>
-          <p:nvPr>
-            <p:ph idx="11"/>
-          </p:nvPr>
-        </p:nvSpPr>
-        <p:spPr/>
-        <p:txBody>
-          <a:bodyPr/>
-          <a:lstStyle/>
-          <a:p>
-            <a:endParaRPr lang="de-DE"/>
-          </a:p>
-        </p:txBody>
-      </p:sp>
-      <p:sp>
-        <p:nvSpPr>
           <p:cNvPr id="4" name="Titel 3">
             <a:extLst>
               <a:ext uri="{FF2B5EF4-FFF2-40B4-BE49-F238E27FC236}">
@@ -10008,9 +9946,16 @@
             <p:ph type="title"/>
           </p:nvPr>
         </p:nvSpPr>
-        <p:spPr/>
-        <p:txBody>
-          <a:bodyPr/>
+        <p:spPr>
+          <a:xfrm>
+            <a:off x="211139" y="153988"/>
+            <a:ext cx="6377086" cy="826740"/>
+          </a:xfrm>
+        </p:spPr>
+        <p:txBody>
+          <a:bodyPr anchor="t">
+            <a:normAutofit/>
+          </a:bodyPr>
           <a:lstStyle/>
           <a:p>
             <a:r>
@@ -10036,14 +9981,36 @@
             <p:ph type="sldNum" sz="quarter" idx="4"/>
           </p:nvPr>
         </p:nvSpPr>
-        <p:spPr/>
-        <p:txBody>
-          <a:bodyPr/>
+        <p:spPr>
+          <a:xfrm>
+            <a:off x="5292080" y="6677050"/>
+            <a:ext cx="758825" cy="162000"/>
+          </a:xfrm>
+        </p:spPr>
+        <p:txBody>
+          <a:bodyPr wrap="none" anchor="ctr">
+            <a:noAutofit/>
+          </a:bodyPr>
           <a:lstStyle/>
           <a:p>
+            <a:pPr>
+              <a:lnSpc>
+                <a:spcPct val="90000"/>
+              </a:lnSpc>
+              <a:spcAft>
+                <a:spcPts val="600"/>
+              </a:spcAft>
+            </a:pPr>
             <a:fld id="{58B5944C-422B-400C-ACEC-079F06A0E4F8}" type="slidenum">
               <a:rPr lang="de-DE" smtClean="0"/>
-              <a:pPr/>
+              <a:pPr>
+                <a:lnSpc>
+                  <a:spcPct val="90000"/>
+                </a:lnSpc>
+                <a:spcAft>
+                  <a:spcPts val="600"/>
+                </a:spcAft>
+              </a:pPr>
               <a:t>8</a:t>
             </a:fld>
             <a:endParaRPr lang="de-DE" dirty="0"/>
@@ -10066,16 +10033,27 @@
             <p:ph type="ftr" sz="quarter" idx="3"/>
           </p:nvPr>
         </p:nvSpPr>
-        <p:spPr/>
-        <p:txBody>
-          <a:bodyPr/>
+        <p:spPr>
+          <a:xfrm>
+            <a:off x="539792" y="6513414"/>
+            <a:ext cx="3240120" cy="327273"/>
+          </a:xfrm>
+        </p:spPr>
+        <p:txBody>
+          <a:bodyPr wrap="none" anchor="ctr">
+            <a:normAutofit/>
+          </a:bodyPr>
           <a:lstStyle/>
           <a:p>
+            <a:pPr>
+              <a:spcAft>
+                <a:spcPts val="600"/>
+              </a:spcAft>
+            </a:pPr>
             <a:r>
               <a:rPr lang="de-DE"/>
               <a:t>Web-Anwendungsentwicklung [MI, 6. Sem.]</a:t>
             </a:r>
-            <a:endParaRPr lang="de-DE" dirty="0"/>
           </a:p>
         </p:txBody>
       </p:sp>
@@ -10095,19 +10073,67 @@
             <p:ph type="dt" sz="half" idx="2"/>
           </p:nvPr>
         </p:nvSpPr>
-        <p:spPr/>
-        <p:txBody>
-          <a:bodyPr/>
+        <p:spPr>
+          <a:xfrm>
+            <a:off x="4139952" y="6678642"/>
+            <a:ext cx="1152128" cy="162000"/>
+          </a:xfrm>
+        </p:spPr>
+        <p:txBody>
+          <a:bodyPr wrap="none" anchor="ctr">
+            <a:noAutofit/>
+          </a:bodyPr>
           <a:lstStyle/>
           <a:p>
-            <a:r>
-              <a:rPr lang="de-DE"/>
+            <a:pPr>
+              <a:lnSpc>
+                <a:spcPct val="90000"/>
+              </a:lnSpc>
+              <a:spcAft>
+                <a:spcPts val="600"/>
+              </a:spcAft>
+            </a:pPr>
+            <a:r>
+              <a:rPr lang="de-DE" dirty="0"/>
               <a:t>04.07.2022</a:t>
             </a:r>
             <a:endParaRPr lang="en-GB" dirty="0"/>
           </a:p>
         </p:txBody>
       </p:sp>
+      <p:pic>
+        <p:nvPicPr>
+          <p:cNvPr id="9" name="Inhaltsplatzhalter 8" descr="Ein Bild, das Tisch enthält.&#10;&#10;Automatisch generierte Beschreibung">
+            <a:extLst>
+              <a:ext uri="{FF2B5EF4-FFF2-40B4-BE49-F238E27FC236}">
+                <a16:creationId xmlns:a16="http://schemas.microsoft.com/office/drawing/2014/main" id="{B9AB1A2E-455B-BC8A-56FF-A67B0879EFFB}"/>
+              </a:ext>
+            </a:extLst>
+          </p:cNvPr>
+          <p:cNvPicPr>
+            <a:picLocks noGrp="1" noChangeAspect="1"/>
+          </p:cNvPicPr>
+          <p:nvPr>
+            <p:ph idx="11"/>
+          </p:nvPr>
+        </p:nvPicPr>
+        <p:blipFill>
+          <a:blip r:embed="rId2"/>
+          <a:stretch>
+            <a:fillRect/>
+          </a:stretch>
+        </p:blipFill>
+        <p:spPr>
+          <a:xfrm>
+            <a:off x="211138" y="1960852"/>
+            <a:ext cx="8753475" cy="3632692"/>
+          </a:xfrm>
+          <a:prstGeom prst="rect">
+            <a:avLst/>
+          </a:prstGeom>
+          <a:noFill/>
+        </p:spPr>
+      </p:pic>
     </p:spTree>
     <p:extLst>
       <p:ext uri="{BB962C8B-B14F-4D97-AF65-F5344CB8AC3E}">
@@ -10197,7 +10223,7 @@
         </p:spPr>
         <p:txBody>
           <a:bodyPr wrap="none" anchor="ctr">
-            <a:normAutofit/>
+            <a:noAutofit/>
           </a:bodyPr>
           <a:lstStyle/>
           <a:p>
@@ -10210,7 +10236,7 @@
               </a:spcAft>
             </a:pPr>
             <a:fld id="{58B5944C-422B-400C-ACEC-079F06A0E4F8}" type="slidenum">
-              <a:rPr lang="de-DE" sz="500" smtClean="0"/>
+              <a:rPr lang="de-DE" smtClean="0"/>
               <a:pPr>
                 <a:lnSpc>
                   <a:spcPct val="90000"/>
@@ -10221,7 +10247,7 @@
               </a:pPr>
               <a:t>9</a:t>
             </a:fld>
-            <a:endParaRPr lang="de-DE" sz="500"/>
+            <a:endParaRPr lang="de-DE" dirty="0"/>
           </a:p>
         </p:txBody>
       </p:sp>
@@ -10289,7 +10315,7 @@
         </p:spPr>
         <p:txBody>
           <a:bodyPr wrap="none" anchor="ctr">
-            <a:normAutofit/>
+            <a:noAutofit/>
           </a:bodyPr>
           <a:lstStyle/>
           <a:p>
@@ -10302,10 +10328,10 @@
               </a:spcAft>
             </a:pPr>
             <a:r>
-              <a:rPr lang="de-DE" sz="500"/>
+              <a:rPr lang="de-DE" dirty="0"/>
               <a:t>04.07.2022</a:t>
             </a:r>
-            <a:endParaRPr lang="en-GB" sz="500"/>
+            <a:endParaRPr lang="en-GB" dirty="0"/>
           </a:p>
         </p:txBody>
       </p:sp>

</xml_diff>

<commit_message>
add icons to techstack
</commit_message>
<xml_diff>
--- a/sys-doc/Präsentation.pptx
+++ b/sys-doc/Präsentation.pptx
@@ -1215,7 +1215,7 @@
       </dsp:nvSpPr>
       <dsp:spPr>
         <a:xfrm>
-          <a:off x="0" y="1526291"/>
+          <a:off x="0" y="409440"/>
           <a:ext cx="2461914" cy="1563315"/>
         </a:xfrm>
         <a:prstGeom prst="roundRect">
@@ -1291,7 +1291,7 @@
       </dsp:nvSpPr>
       <dsp:spPr>
         <a:xfrm>
-          <a:off x="273546" y="1786160"/>
+          <a:off x="273546" y="669309"/>
           <a:ext cx="2461914" cy="1563315"/>
         </a:xfrm>
         <a:prstGeom prst="roundRect">
@@ -1359,7 +1359,7 @@
         </a:p>
       </dsp:txBody>
       <dsp:txXfrm>
-        <a:off x="319334" y="1831948"/>
+        <a:off x="319334" y="715097"/>
         <a:ext cx="2370338" cy="1471739"/>
       </dsp:txXfrm>
     </dsp:sp>
@@ -1370,7 +1370,7 @@
       </dsp:nvSpPr>
       <dsp:spPr>
         <a:xfrm>
-          <a:off x="3009007" y="1526291"/>
+          <a:off x="3009007" y="409440"/>
           <a:ext cx="2461914" cy="1563315"/>
         </a:xfrm>
         <a:prstGeom prst="roundRect">
@@ -1446,7 +1446,7 @@
       </dsp:nvSpPr>
       <dsp:spPr>
         <a:xfrm>
-          <a:off x="3282553" y="1786160"/>
+          <a:off x="3282553" y="669309"/>
           <a:ext cx="2461914" cy="1563315"/>
         </a:xfrm>
         <a:prstGeom prst="roundRect">
@@ -1514,7 +1514,7 @@
         </a:p>
       </dsp:txBody>
       <dsp:txXfrm>
-        <a:off x="3328341" y="1831948"/>
+        <a:off x="3328341" y="715097"/>
         <a:ext cx="2370338" cy="1471739"/>
       </dsp:txXfrm>
     </dsp:sp>
@@ -1525,7 +1525,7 @@
       </dsp:nvSpPr>
       <dsp:spPr>
         <a:xfrm>
-          <a:off x="6018014" y="1526291"/>
+          <a:off x="6018014" y="409440"/>
           <a:ext cx="2461914" cy="1563315"/>
         </a:xfrm>
         <a:prstGeom prst="roundRect">
@@ -1601,7 +1601,7 @@
       </dsp:nvSpPr>
       <dsp:spPr>
         <a:xfrm>
-          <a:off x="6291560" y="1786160"/>
+          <a:off x="6291560" y="669309"/>
           <a:ext cx="2461914" cy="1563315"/>
         </a:xfrm>
         <a:prstGeom prst="roundRect">
@@ -1669,7 +1669,7 @@
         </a:p>
       </dsp:txBody>
       <dsp:txXfrm>
-        <a:off x="6337348" y="1831948"/>
+        <a:off x="6337348" y="715097"/>
         <a:ext cx="2370338" cy="1471739"/>
       </dsp:txXfrm>
     </dsp:sp>
@@ -8992,14 +8992,14 @@
             <p:ph idx="11"/>
             <p:extLst>
               <p:ext uri="{D42A27DB-BD31-4B8C-83A1-F6EECF244321}">
-                <p14:modId xmlns:p14="http://schemas.microsoft.com/office/powerpoint/2010/main" val="1048077046"/>
+                <p14:modId xmlns:p14="http://schemas.microsoft.com/office/powerpoint/2010/main" val="1589724969"/>
               </p:ext>
             </p:extLst>
           </p:nvPr>
         </p:nvGraphicFramePr>
         <p:xfrm>
-          <a:off x="211138" y="1339314"/>
-          <a:ext cx="8753475" cy="4875768"/>
+          <a:off x="155248" y="1556792"/>
+          <a:ext cx="8753475" cy="2642066"/>
         </p:xfrm>
         <a:graphic>
           <a:graphicData uri="http://schemas.openxmlformats.org/drawingml/2006/diagram">
@@ -9007,6 +9007,222 @@
           </a:graphicData>
         </a:graphic>
       </p:graphicFrame>
+      <p:pic>
+        <p:nvPicPr>
+          <p:cNvPr id="1026" name="Picture 2" descr="TypeScript">
+            <a:extLst>
+              <a:ext uri="{FF2B5EF4-FFF2-40B4-BE49-F238E27FC236}">
+                <a16:creationId xmlns:a16="http://schemas.microsoft.com/office/drawing/2014/main" id="{A0E98218-A8F5-18DA-871A-2B78E275C5E4}"/>
+              </a:ext>
+            </a:extLst>
+          </p:cNvPr>
+          <p:cNvPicPr>
+            <a:picLocks noChangeAspect="1" noChangeArrowheads="1"/>
+          </p:cNvPicPr>
+          <p:nvPr/>
+        </p:nvPicPr>
+        <p:blipFill rotWithShape="1">
+          <a:blip r:embed="rId8" cstate="print">
+            <a:extLst>
+              <a:ext uri="{28A0092B-C50C-407E-A947-70E740481C1C}">
+                <a14:useLocalDpi xmlns:a14="http://schemas.microsoft.com/office/drawing/2010/main" val="0"/>
+              </a:ext>
+            </a:extLst>
+          </a:blip>
+          <a:srcRect t="18443" b="13838"/>
+          <a:stretch/>
+        </p:blipFill>
+        <p:spPr bwMode="auto">
+          <a:xfrm>
+            <a:off x="755576" y="5345428"/>
+            <a:ext cx="4996541" cy="1068538"/>
+          </a:xfrm>
+          <a:prstGeom prst="rect">
+            <a:avLst/>
+          </a:prstGeom>
+          <a:noFill/>
+          <a:extLst>
+            <a:ext uri="{909E8E84-426E-40DD-AFC4-6F175D3DCCD1}">
+              <a14:hiddenFill xmlns:a14="http://schemas.microsoft.com/office/drawing/2010/main">
+                <a:solidFill>
+                  <a:srgbClr val="FFFFFF"/>
+                </a:solidFill>
+              </a14:hiddenFill>
+            </a:ext>
+          </a:extLst>
+        </p:spPr>
+      </p:pic>
+      <p:pic>
+        <p:nvPicPr>
+          <p:cNvPr id="1028" name="Picture 4">
+            <a:extLst>
+              <a:ext uri="{FF2B5EF4-FFF2-40B4-BE49-F238E27FC236}">
+                <a16:creationId xmlns:a16="http://schemas.microsoft.com/office/drawing/2014/main" id="{FEEA3F8E-53FB-C2AB-DF9F-C2E96D51717F}"/>
+              </a:ext>
+            </a:extLst>
+          </p:cNvPr>
+          <p:cNvPicPr>
+            <a:picLocks noChangeAspect="1" noChangeArrowheads="1"/>
+          </p:cNvPicPr>
+          <p:nvPr/>
+        </p:nvPicPr>
+        <p:blipFill>
+          <a:blip r:embed="rId9" cstate="print">
+            <a:extLst>
+              <a:ext uri="{28A0092B-C50C-407E-A947-70E740481C1C}">
+                <a14:useLocalDpi xmlns:a14="http://schemas.microsoft.com/office/drawing/2010/main" val="0"/>
+              </a:ext>
+            </a:extLst>
+          </a:blip>
+          <a:srcRect/>
+          <a:stretch>
+            <a:fillRect/>
+          </a:stretch>
+        </p:blipFill>
+        <p:spPr bwMode="auto">
+          <a:xfrm>
+            <a:off x="330013" y="3897744"/>
+            <a:ext cx="1106590" cy="962252"/>
+          </a:xfrm>
+          <a:prstGeom prst="rect">
+            <a:avLst/>
+          </a:prstGeom>
+          <a:noFill/>
+          <a:extLst>
+            <a:ext uri="{909E8E84-426E-40DD-AFC4-6F175D3DCCD1}">
+              <a14:hiddenFill xmlns:a14="http://schemas.microsoft.com/office/drawing/2010/main">
+                <a:solidFill>
+                  <a:srgbClr val="FFFFFF"/>
+                </a:solidFill>
+              </a14:hiddenFill>
+            </a:ext>
+          </a:extLst>
+        </p:spPr>
+      </p:pic>
+      <p:pic>
+        <p:nvPicPr>
+          <p:cNvPr id="6" name="Grafik 5">
+            <a:extLst>
+              <a:ext uri="{FF2B5EF4-FFF2-40B4-BE49-F238E27FC236}">
+                <a16:creationId xmlns:a16="http://schemas.microsoft.com/office/drawing/2014/main" id="{E11A2144-4BD1-D64C-2360-ADE475EFED3E}"/>
+              </a:ext>
+            </a:extLst>
+          </p:cNvPr>
+          <p:cNvPicPr>
+            <a:picLocks noChangeAspect="1"/>
+          </p:cNvPicPr>
+          <p:nvPr/>
+        </p:nvPicPr>
+        <p:blipFill>
+          <a:blip r:embed="rId10"/>
+          <a:stretch>
+            <a:fillRect/>
+          </a:stretch>
+        </p:blipFill>
+        <p:spPr>
+          <a:xfrm>
+            <a:off x="1611367" y="3897744"/>
+            <a:ext cx="1096969" cy="962252"/>
+          </a:xfrm>
+          <a:prstGeom prst="rect">
+            <a:avLst/>
+          </a:prstGeom>
+        </p:spPr>
+      </p:pic>
+      <p:pic>
+        <p:nvPicPr>
+          <p:cNvPr id="1030" name="Picture 6" descr="Working with Express, a Node.js Framework | by Daniel Wagener | Medium">
+            <a:extLst>
+              <a:ext uri="{FF2B5EF4-FFF2-40B4-BE49-F238E27FC236}">
+                <a16:creationId xmlns:a16="http://schemas.microsoft.com/office/drawing/2014/main" id="{79F3500C-E078-541A-5BD8-6C0005EBC2AC}"/>
+              </a:ext>
+            </a:extLst>
+          </p:cNvPr>
+          <p:cNvPicPr>
+            <a:picLocks noChangeAspect="1" noChangeArrowheads="1"/>
+          </p:cNvPicPr>
+          <p:nvPr/>
+        </p:nvPicPr>
+        <p:blipFill>
+          <a:blip r:embed="rId11">
+            <a:extLst>
+              <a:ext uri="{28A0092B-C50C-407E-A947-70E740481C1C}">
+                <a14:useLocalDpi xmlns:a14="http://schemas.microsoft.com/office/drawing/2010/main" val="0"/>
+              </a:ext>
+            </a:extLst>
+          </a:blip>
+          <a:srcRect/>
+          <a:stretch>
+            <a:fillRect/>
+          </a:stretch>
+        </p:blipFill>
+        <p:spPr bwMode="auto">
+          <a:xfrm>
+            <a:off x="3465941" y="3923337"/>
+            <a:ext cx="2303620" cy="1268569"/>
+          </a:xfrm>
+          <a:prstGeom prst="rect">
+            <a:avLst/>
+          </a:prstGeom>
+          <a:noFill/>
+          <a:extLst>
+            <a:ext uri="{909E8E84-426E-40DD-AFC4-6F175D3DCCD1}">
+              <a14:hiddenFill xmlns:a14="http://schemas.microsoft.com/office/drawing/2010/main">
+                <a:solidFill>
+                  <a:srgbClr val="FFFFFF"/>
+                </a:solidFill>
+              </a14:hiddenFill>
+            </a:ext>
+          </a:extLst>
+        </p:spPr>
+      </p:pic>
+      <p:pic>
+        <p:nvPicPr>
+          <p:cNvPr id="1036" name="Picture 12">
+            <a:extLst>
+              <a:ext uri="{FF2B5EF4-FFF2-40B4-BE49-F238E27FC236}">
+                <a16:creationId xmlns:a16="http://schemas.microsoft.com/office/drawing/2014/main" id="{C6E4D747-E6D7-5101-7A27-D02A06EF3F8E}"/>
+              </a:ext>
+            </a:extLst>
+          </p:cNvPr>
+          <p:cNvPicPr>
+            <a:picLocks noChangeAspect="1" noChangeArrowheads="1"/>
+          </p:cNvPicPr>
+          <p:nvPr/>
+        </p:nvPicPr>
+        <p:blipFill>
+          <a:blip r:embed="rId12" cstate="print">
+            <a:extLst>
+              <a:ext uri="{28A0092B-C50C-407E-A947-70E740481C1C}">
+                <a14:useLocalDpi xmlns:a14="http://schemas.microsoft.com/office/drawing/2010/main" val="0"/>
+              </a:ext>
+            </a:extLst>
+          </a:blip>
+          <a:srcRect/>
+          <a:stretch>
+            <a:fillRect/>
+          </a:stretch>
+        </p:blipFill>
+        <p:spPr bwMode="auto">
+          <a:xfrm>
+            <a:off x="6285894" y="3852730"/>
+            <a:ext cx="2550812" cy="1339176"/>
+          </a:xfrm>
+          <a:prstGeom prst="rect">
+            <a:avLst/>
+          </a:prstGeom>
+          <a:noFill/>
+          <a:extLst>
+            <a:ext uri="{909E8E84-426E-40DD-AFC4-6F175D3DCCD1}">
+              <a14:hiddenFill xmlns:a14="http://schemas.microsoft.com/office/drawing/2010/main">
+                <a:solidFill>
+                  <a:srgbClr val="FFFFFF"/>
+                </a:solidFill>
+              </a14:hiddenFill>
+            </a:ext>
+          </a:extLst>
+        </p:spPr>
+      </p:pic>
     </p:spTree>
   </p:cSld>
   <p:clrMapOvr>

</xml_diff>